<commit_message>
fix ppt to internal eval requirement
</commit_message>
<xml_diff>
--- a/Requirement/specification/CareNest.pptx
+++ b/Requirement/specification/CareNest.pptx
@@ -5,7 +5,7 @@
     <p:sldMasterId id="2147483648" r:id="rId1"/>
   </p:sldMasterIdLst>
   <p:notesMasterIdLst>
-    <p:notesMasterId r:id="rId30"/>
+    <p:notesMasterId r:id="rId29"/>
   </p:notesMasterIdLst>
   <p:sldIdLst>
     <p:sldId id="256" r:id="rId2"/>
@@ -21,21 +21,20 @@
     <p:sldId id="279" r:id="rId12"/>
     <p:sldId id="277" r:id="rId13"/>
     <p:sldId id="292" r:id="rId14"/>
-    <p:sldId id="293" r:id="rId15"/>
+    <p:sldId id="298" r:id="rId15"/>
     <p:sldId id="295" r:id="rId16"/>
     <p:sldId id="296" r:id="rId17"/>
     <p:sldId id="280" r:id="rId18"/>
     <p:sldId id="284" r:id="rId19"/>
     <p:sldId id="286" r:id="rId20"/>
-    <p:sldId id="281" r:id="rId21"/>
-    <p:sldId id="289" r:id="rId22"/>
-    <p:sldId id="287" r:id="rId23"/>
-    <p:sldId id="262" r:id="rId24"/>
-    <p:sldId id="291" r:id="rId25"/>
-    <p:sldId id="288" r:id="rId26"/>
-    <p:sldId id="282" r:id="rId27"/>
-    <p:sldId id="260" r:id="rId28"/>
-    <p:sldId id="261" r:id="rId29"/>
+    <p:sldId id="289" r:id="rId21"/>
+    <p:sldId id="287" r:id="rId22"/>
+    <p:sldId id="262" r:id="rId23"/>
+    <p:sldId id="291" r:id="rId24"/>
+    <p:sldId id="288" r:id="rId25"/>
+    <p:sldId id="282" r:id="rId26"/>
+    <p:sldId id="260" r:id="rId27"/>
+    <p:sldId id="261" r:id="rId28"/>
   </p:sldIdLst>
   <p:sldSz cx="12192000" cy="6858000"/>
   <p:notesSz cx="6858000" cy="9144000"/>
@@ -224,7 +223,7 @@
           <a:p>
             <a:fld id="{D9FB863F-6DA7-4E2C-9AF4-A1919C443414}" type="datetimeFigureOut">
               <a:rPr lang="en-PK" smtClean="0"/>
-              <a:t>07/10/2025</a:t>
+              <a:t>07/13/2025</a:t>
             </a:fld>
             <a:endParaRPr lang="en-PK"/>
           </a:p>
@@ -497,7 +496,13 @@
   <p:cSld>
     <p:spTree>
       <p:nvGrpSpPr>
-        <p:cNvPr id="1" name=""/>
+        <p:cNvPr id="1" name="">
+          <a:extLst>
+            <a:ext uri="{FF2B5EF4-FFF2-40B4-BE49-F238E27FC236}">
+              <a16:creationId xmlns:a16="http://schemas.microsoft.com/office/drawing/2014/main" id="{9A968075-5F76-0058-5022-FE94D47BC93A}"/>
+            </a:ext>
+          </a:extLst>
+        </p:cNvPr>
         <p:cNvGrpSpPr/>
         <p:nvPr/>
       </p:nvGrpSpPr>
@@ -511,7 +516,13 @@
       </p:grpSpPr>
       <p:sp>
         <p:nvSpPr>
-          <p:cNvPr id="2" name="Slide Image Placeholder 1"/>
+          <p:cNvPr id="2" name="Slide Image Placeholder 1">
+            <a:extLst>
+              <a:ext uri="{FF2B5EF4-FFF2-40B4-BE49-F238E27FC236}">
+                <a16:creationId xmlns:a16="http://schemas.microsoft.com/office/drawing/2014/main" id="{EEC0A496-4ACE-27A7-FFD1-1ADDE1350C39}"/>
+              </a:ext>
+            </a:extLst>
+          </p:cNvPr>
           <p:cNvSpPr>
             <a:spLocks noGrp="1" noRot="1" noChangeAspect="1"/>
           </p:cNvSpPr>
@@ -523,7 +534,13 @@
       </p:sp>
       <p:sp>
         <p:nvSpPr>
-          <p:cNvPr id="3" name="Notes Placeholder 2"/>
+          <p:cNvPr id="3" name="Notes Placeholder 2">
+            <a:extLst>
+              <a:ext uri="{FF2B5EF4-FFF2-40B4-BE49-F238E27FC236}">
+                <a16:creationId xmlns:a16="http://schemas.microsoft.com/office/drawing/2014/main" id="{CF7E5DC1-8B83-E6E8-4DCF-8C0844B2698D}"/>
+              </a:ext>
+            </a:extLst>
+          </p:cNvPr>
           <p:cNvSpPr>
             <a:spLocks noGrp="1"/>
           </p:cNvSpPr>
@@ -542,7 +559,13 @@
       </p:sp>
       <p:sp>
         <p:nvSpPr>
-          <p:cNvPr id="4" name="Slide Number Placeholder 3"/>
+          <p:cNvPr id="4" name="Slide Number Placeholder 3">
+            <a:extLst>
+              <a:ext uri="{FF2B5EF4-FFF2-40B4-BE49-F238E27FC236}">
+                <a16:creationId xmlns:a16="http://schemas.microsoft.com/office/drawing/2014/main" id="{0B73069A-E512-DD6B-97E7-0BF0C57B613D}"/>
+              </a:ext>
+            </a:extLst>
+          </p:cNvPr>
           <p:cNvSpPr>
             <a:spLocks noGrp="1"/>
           </p:cNvSpPr>
@@ -566,7 +589,7 @@
     </p:spTree>
     <p:extLst>
       <p:ext uri="{BB962C8B-B14F-4D97-AF65-F5344CB8AC3E}">
-        <p14:creationId xmlns:p14="http://schemas.microsoft.com/office/powerpoint/2010/main" val="1987478961"/>
+        <p14:creationId xmlns:p14="http://schemas.microsoft.com/office/powerpoint/2010/main" val="3388300610"/>
       </p:ext>
     </p:extLst>
   </p:cSld>
@@ -651,6 +674,90 @@
     <p:extLst>
       <p:ext uri="{BB962C8B-B14F-4D97-AF65-F5344CB8AC3E}">
         <p14:creationId xmlns:p14="http://schemas.microsoft.com/office/powerpoint/2010/main" val="3752913222"/>
+      </p:ext>
+    </p:extLst>
+  </p:cSld>
+  <p:clrMapOvr>
+    <a:masterClrMapping/>
+  </p:clrMapOvr>
+</p:notes>
+</file>
+
+<file path=ppt/notesSlides/notesSlide3.xml><?xml version="1.0" encoding="utf-8"?>
+<p:notes xmlns:a="http://schemas.openxmlformats.org/drawingml/2006/main" xmlns:r="http://schemas.openxmlformats.org/officeDocument/2006/relationships" xmlns:p="http://schemas.openxmlformats.org/presentationml/2006/main">
+  <p:cSld>
+    <p:spTree>
+      <p:nvGrpSpPr>
+        <p:cNvPr id="1" name=""/>
+        <p:cNvGrpSpPr/>
+        <p:nvPr/>
+      </p:nvGrpSpPr>
+      <p:grpSpPr>
+        <a:xfrm>
+          <a:off x="0" y="0"/>
+          <a:ext cx="0" cy="0"/>
+          <a:chOff x="0" y="0"/>
+          <a:chExt cx="0" cy="0"/>
+        </a:xfrm>
+      </p:grpSpPr>
+      <p:sp>
+        <p:nvSpPr>
+          <p:cNvPr id="2" name="Slide Image Placeholder 1"/>
+          <p:cNvSpPr>
+            <a:spLocks noGrp="1" noRot="1" noChangeAspect="1"/>
+          </p:cNvSpPr>
+          <p:nvPr>
+            <p:ph type="sldImg"/>
+          </p:nvPr>
+        </p:nvSpPr>
+        <p:spPr/>
+      </p:sp>
+      <p:sp>
+        <p:nvSpPr>
+          <p:cNvPr id="3" name="Notes Placeholder 2"/>
+          <p:cNvSpPr>
+            <a:spLocks noGrp="1"/>
+          </p:cNvSpPr>
+          <p:nvPr>
+            <p:ph type="body" idx="1"/>
+          </p:nvPr>
+        </p:nvSpPr>
+        <p:spPr/>
+        <p:txBody>
+          <a:bodyPr/>
+          <a:lstStyle/>
+          <a:p>
+            <a:endParaRPr lang="en-US" dirty="0"/>
+          </a:p>
+        </p:txBody>
+      </p:sp>
+      <p:sp>
+        <p:nvSpPr>
+          <p:cNvPr id="4" name="Slide Number Placeholder 3"/>
+          <p:cNvSpPr>
+            <a:spLocks noGrp="1"/>
+          </p:cNvSpPr>
+          <p:nvPr>
+            <p:ph type="sldNum" sz="quarter" idx="5"/>
+          </p:nvPr>
+        </p:nvSpPr>
+        <p:spPr/>
+        <p:txBody>
+          <a:bodyPr/>
+          <a:lstStyle/>
+          <a:p>
+            <a:fld id="{A98CEC98-0085-4F7A-80FE-FC9B44690311}" type="slidenum">
+              <a:rPr lang="en-PK" smtClean="0"/>
+              <a:t>22</a:t>
+            </a:fld>
+            <a:endParaRPr lang="en-PK"/>
+          </a:p>
+        </p:txBody>
+      </p:sp>
+    </p:spTree>
+    <p:extLst>
+      <p:ext uri="{BB962C8B-B14F-4D97-AF65-F5344CB8AC3E}">
+        <p14:creationId xmlns:p14="http://schemas.microsoft.com/office/powerpoint/2010/main" val="3970118018"/>
       </p:ext>
     </p:extLst>
   </p:cSld>
@@ -809,7 +916,7 @@
           <a:p>
             <a:fld id="{FDD5305B-B2D0-43AA-9C84-A120827CAE0A}" type="datetimeFigureOut">
               <a:rPr lang="en-PK" smtClean="0"/>
-              <a:t>07/10/2025</a:t>
+              <a:t>07/13/2025</a:t>
             </a:fld>
             <a:endParaRPr lang="en-PK"/>
           </a:p>
@@ -1009,7 +1116,7 @@
           <a:p>
             <a:fld id="{FDD5305B-B2D0-43AA-9C84-A120827CAE0A}" type="datetimeFigureOut">
               <a:rPr lang="en-PK" smtClean="0"/>
-              <a:t>07/10/2025</a:t>
+              <a:t>07/13/2025</a:t>
             </a:fld>
             <a:endParaRPr lang="en-PK"/>
           </a:p>
@@ -1219,7 +1326,7 @@
           <a:p>
             <a:fld id="{FDD5305B-B2D0-43AA-9C84-A120827CAE0A}" type="datetimeFigureOut">
               <a:rPr lang="en-PK" smtClean="0"/>
-              <a:t>07/10/2025</a:t>
+              <a:t>07/13/2025</a:t>
             </a:fld>
             <a:endParaRPr lang="en-PK"/>
           </a:p>
@@ -1419,7 +1526,7 @@
           <a:p>
             <a:fld id="{FDD5305B-B2D0-43AA-9C84-A120827CAE0A}" type="datetimeFigureOut">
               <a:rPr lang="en-PK" smtClean="0"/>
-              <a:t>07/10/2025</a:t>
+              <a:t>07/13/2025</a:t>
             </a:fld>
             <a:endParaRPr lang="en-PK"/>
           </a:p>
@@ -1695,7 +1802,7 @@
           <a:p>
             <a:fld id="{FDD5305B-B2D0-43AA-9C84-A120827CAE0A}" type="datetimeFigureOut">
               <a:rPr lang="en-PK" smtClean="0"/>
-              <a:t>07/10/2025</a:t>
+              <a:t>07/13/2025</a:t>
             </a:fld>
             <a:endParaRPr lang="en-PK"/>
           </a:p>
@@ -1963,7 +2070,7 @@
           <a:p>
             <a:fld id="{FDD5305B-B2D0-43AA-9C84-A120827CAE0A}" type="datetimeFigureOut">
               <a:rPr lang="en-PK" smtClean="0"/>
-              <a:t>07/10/2025</a:t>
+              <a:t>07/13/2025</a:t>
             </a:fld>
             <a:endParaRPr lang="en-PK"/>
           </a:p>
@@ -2378,7 +2485,7 @@
           <a:p>
             <a:fld id="{FDD5305B-B2D0-43AA-9C84-A120827CAE0A}" type="datetimeFigureOut">
               <a:rPr lang="en-PK" smtClean="0"/>
-              <a:t>07/10/2025</a:t>
+              <a:t>07/13/2025</a:t>
             </a:fld>
             <a:endParaRPr lang="en-PK"/>
           </a:p>
@@ -2520,7 +2627,7 @@
           <a:p>
             <a:fld id="{FDD5305B-B2D0-43AA-9C84-A120827CAE0A}" type="datetimeFigureOut">
               <a:rPr lang="en-PK" smtClean="0"/>
-              <a:t>07/10/2025</a:t>
+              <a:t>07/13/2025</a:t>
             </a:fld>
             <a:endParaRPr lang="en-PK"/>
           </a:p>
@@ -2633,7 +2740,7 @@
           <a:p>
             <a:fld id="{FDD5305B-B2D0-43AA-9C84-A120827CAE0A}" type="datetimeFigureOut">
               <a:rPr lang="en-PK" smtClean="0"/>
-              <a:t>07/10/2025</a:t>
+              <a:t>07/13/2025</a:t>
             </a:fld>
             <a:endParaRPr lang="en-PK"/>
           </a:p>
@@ -2946,7 +3053,7 @@
           <a:p>
             <a:fld id="{FDD5305B-B2D0-43AA-9C84-A120827CAE0A}" type="datetimeFigureOut">
               <a:rPr lang="en-PK" smtClean="0"/>
-              <a:t>07/10/2025</a:t>
+              <a:t>07/13/2025</a:t>
             </a:fld>
             <a:endParaRPr lang="en-PK"/>
           </a:p>
@@ -3235,7 +3342,7 @@
           <a:p>
             <a:fld id="{FDD5305B-B2D0-43AA-9C84-A120827CAE0A}" type="datetimeFigureOut">
               <a:rPr lang="en-PK" smtClean="0"/>
-              <a:t>07/10/2025</a:t>
+              <a:t>07/13/2025</a:t>
             </a:fld>
             <a:endParaRPr lang="en-PK"/>
           </a:p>
@@ -3478,7 +3585,7 @@
           <a:p>
             <a:fld id="{FDD5305B-B2D0-43AA-9C84-A120827CAE0A}" type="datetimeFigureOut">
               <a:rPr lang="en-PK" smtClean="0"/>
-              <a:t>07/10/2025</a:t>
+              <a:t>07/13/2025</a:t>
             </a:fld>
             <a:endParaRPr lang="en-PK"/>
           </a:p>
@@ -5167,7 +5274,7 @@
         <p:cNvPr id="1" name="">
           <a:extLst>
             <a:ext uri="{FF2B5EF4-FFF2-40B4-BE49-F238E27FC236}">
-              <a16:creationId xmlns:a16="http://schemas.microsoft.com/office/drawing/2014/main" id="{68BD2FC3-6E7D-8EE2-1058-59DE834F6ED4}"/>
+              <a16:creationId xmlns:a16="http://schemas.microsoft.com/office/drawing/2014/main" id="{1D6280EB-A80C-4374-7419-E40938BE80AD}"/>
             </a:ext>
           </a:extLst>
         </p:cNvPr>
@@ -5184,10 +5291,10 @@
       </p:grpSpPr>
       <p:pic>
         <p:nvPicPr>
-          <p:cNvPr id="8" name="Picture 7" descr="A diagram of a company&#10;&#10;AI-generated content may be incorrect.">
-            <a:extLst>
-              <a:ext uri="{FF2B5EF4-FFF2-40B4-BE49-F238E27FC236}">
-                <a16:creationId xmlns:a16="http://schemas.microsoft.com/office/drawing/2014/main" id="{4F3B1EC0-8331-7142-C815-4451317E33A8}"/>
+          <p:cNvPr id="5" name="Picture 4" descr="A diagram of a flowchart&#10;&#10;AI-generated content may be incorrect.">
+            <a:extLst>
+              <a:ext uri="{FF2B5EF4-FFF2-40B4-BE49-F238E27FC236}">
+                <a16:creationId xmlns:a16="http://schemas.microsoft.com/office/drawing/2014/main" id="{00AB13DA-684D-8823-2FAE-F3E91E0D3B51}"/>
               </a:ext>
             </a:extLst>
           </p:cNvPr>
@@ -5210,8 +5317,8 @@
         </p:blipFill>
         <p:spPr>
           <a:xfrm>
-            <a:off x="838200" y="759800"/>
-            <a:ext cx="9504372" cy="5733075"/>
+            <a:off x="6394184" y="101600"/>
+            <a:ext cx="3631800" cy="6654800"/>
           </a:xfrm>
           <a:prstGeom prst="rect">
             <a:avLst/>
@@ -5223,7 +5330,7 @@
           <p:cNvPr id="2" name="Title 1">
             <a:extLst>
               <a:ext uri="{FF2B5EF4-FFF2-40B4-BE49-F238E27FC236}">
-                <a16:creationId xmlns:a16="http://schemas.microsoft.com/office/drawing/2014/main" id="{BB5E4A56-6495-19C0-ACA7-1399A08C634A}"/>
+                <a16:creationId xmlns:a16="http://schemas.microsoft.com/office/drawing/2014/main" id="{F1D85B25-A559-4469-B14A-F5623BC97A4C}"/>
               </a:ext>
             </a:extLst>
           </p:cNvPr>
@@ -5234,14 +5341,20 @@
             <p:ph type="title"/>
           </p:nvPr>
         </p:nvSpPr>
-        <p:spPr/>
+        <p:spPr>
+          <a:xfrm>
+            <a:off x="867383" y="2077193"/>
+            <a:ext cx="4560651" cy="2416986"/>
+          </a:xfrm>
+        </p:spPr>
         <p:txBody>
           <a:bodyPr/>
           <a:lstStyle/>
           <a:p>
+            <a:pPr algn="ctr"/>
             <a:r>
               <a:rPr lang="en-US" dirty="0"/>
-              <a:t>Database Diagram (NOSQL Schema)</a:t>
+              <a:t>Activity Diagram</a:t>
             </a:r>
             <a:endParaRPr lang="en-PK" dirty="0"/>
           </a:p>
@@ -5252,7 +5365,7 @@
           <p:cNvPr id="3" name="Rectangle 2">
             <a:extLst>
               <a:ext uri="{FF2B5EF4-FFF2-40B4-BE49-F238E27FC236}">
-                <a16:creationId xmlns:a16="http://schemas.microsoft.com/office/drawing/2014/main" id="{A060AB63-8F71-D85F-7C00-885B56A58471}"/>
+                <a16:creationId xmlns:a16="http://schemas.microsoft.com/office/drawing/2014/main" id="{8EFD7286-3393-3C62-A5FF-FF99E7A0FA48}"/>
               </a:ext>
             </a:extLst>
           </p:cNvPr>
@@ -5305,7 +5418,7 @@
     </p:spTree>
     <p:extLst>
       <p:ext uri="{BB962C8B-B14F-4D97-AF65-F5344CB8AC3E}">
-        <p14:creationId xmlns:p14="http://schemas.microsoft.com/office/powerpoint/2010/main" val="483659036"/>
+        <p14:creationId xmlns:p14="http://schemas.microsoft.com/office/powerpoint/2010/main" val="3720112430"/>
       </p:ext>
     </p:extLst>
   </p:cSld>
@@ -6572,7 +6685,13 @@
   <p:cSld>
     <p:spTree>
       <p:nvGrpSpPr>
-        <p:cNvPr id="1" name=""/>
+        <p:cNvPr id="1" name="">
+          <a:extLst>
+            <a:ext uri="{FF2B5EF4-FFF2-40B4-BE49-F238E27FC236}">
+              <a16:creationId xmlns:a16="http://schemas.microsoft.com/office/drawing/2014/main" id="{BCE78E47-FE14-8C81-D294-B8B4361081DB}"/>
+            </a:ext>
+          </a:extLst>
+        </p:cNvPr>
         <p:cNvGrpSpPr/>
         <p:nvPr/>
       </p:nvGrpSpPr>
@@ -6589,7 +6708,7 @@
           <p:cNvPr id="2" name="Title 1">
             <a:extLst>
               <a:ext uri="{FF2B5EF4-FFF2-40B4-BE49-F238E27FC236}">
-                <a16:creationId xmlns:a16="http://schemas.microsoft.com/office/drawing/2014/main" id="{A049C0A6-D903-4501-6D0C-1380C13610BD}"/>
+                <a16:creationId xmlns:a16="http://schemas.microsoft.com/office/drawing/2014/main" id="{E5E15EAF-9EF7-A57D-C7D9-6C6239B35552}"/>
               </a:ext>
             </a:extLst>
           </p:cNvPr>
@@ -6618,7 +6737,7 @@
           <p:cNvPr id="3" name="Content Placeholder 2">
             <a:extLst>
               <a:ext uri="{FF2B5EF4-FFF2-40B4-BE49-F238E27FC236}">
-                <a16:creationId xmlns:a16="http://schemas.microsoft.com/office/drawing/2014/main" id="{D9A5032D-CB7B-71AA-FD84-EA8ADC79C9E7}"/>
+                <a16:creationId xmlns:a16="http://schemas.microsoft.com/office/drawing/2014/main" id="{BB48BDDA-F1AC-9BDD-34C0-09AB256748A7}"/>
               </a:ext>
             </a:extLst>
           </p:cNvPr>
@@ -6629,7 +6748,12 @@
             <p:ph idx="1"/>
           </p:nvPr>
         </p:nvSpPr>
-        <p:spPr/>
+        <p:spPr>
+          <a:xfrm>
+            <a:off x="838200" y="3653992"/>
+            <a:ext cx="10515600" cy="2275320"/>
+          </a:xfrm>
+        </p:spPr>
         <p:txBody>
           <a:bodyPr>
             <a:normAutofit/>
@@ -6641,14 +6765,8 @@
             </a:pPr>
             <a:r>
               <a:rPr lang="en-US" b="1" dirty="0"/>
-              <a:t>Challenges:</a:t>
-            </a:r>
-          </a:p>
-          <a:p>
-            <a:pPr marL="0" indent="0">
-              <a:buNone/>
-            </a:pPr>
-            <a:endParaRPr lang="en-US" b="1" dirty="0"/>
+              <a:t>Future Enhancements:</a:t>
+            </a:r>
           </a:p>
           <a:p>
             <a:pPr>
@@ -6657,7 +6775,7 @@
             </a:pPr>
             <a:r>
               <a:rPr lang="en-US" dirty="0"/>
-              <a:t>Sensor Calibration Issues – Ensuring accuracy.</a:t>
+              <a:t>AI-based Cry Detection – Recognizing baby’s cries.</a:t>
             </a:r>
           </a:p>
           <a:p>
@@ -6667,7 +6785,7 @@
             </a:pPr>
             <a:r>
               <a:rPr lang="en-US" dirty="0"/>
-              <a:t>Power Consumption – Optimizing energy efficiency.</a:t>
+              <a:t>Sleep Pattern Monitoring – Using machine learning.</a:t>
             </a:r>
           </a:p>
           <a:p>
@@ -6677,14 +6795,14 @@
             </a:pPr>
             <a:r>
               <a:rPr lang="en-US" dirty="0"/>
-              <a:t>Network Dependency – Reducing reliance on the internet.</a:t>
+              <a:t>Integration with Smart Home Systems – Google Home/Alexa.</a:t>
             </a:r>
           </a:p>
           <a:p>
             <a:pPr marL="0" indent="0">
               <a:buNone/>
             </a:pPr>
-            <a:endParaRPr lang="en-US" dirty="0"/>
+            <a:endParaRPr lang="en-PK" dirty="0"/>
           </a:p>
         </p:txBody>
       </p:sp>
@@ -6693,7 +6811,7 @@
           <p:cNvPr id="4" name="Rectangle 3">
             <a:extLst>
               <a:ext uri="{FF2B5EF4-FFF2-40B4-BE49-F238E27FC236}">
-                <a16:creationId xmlns:a16="http://schemas.microsoft.com/office/drawing/2014/main" id="{993D134C-7819-88A1-5246-6ED24BEB4C19}"/>
+                <a16:creationId xmlns:a16="http://schemas.microsoft.com/office/drawing/2014/main" id="{C898119E-4C11-EA16-2A7A-CBEAAB99F14F}"/>
               </a:ext>
             </a:extLst>
           </p:cNvPr>
@@ -6743,107 +6861,206 @@
           </a:p>
         </p:txBody>
       </p:sp>
-    </p:spTree>
-    <p:extLst>
-      <p:ext uri="{BB962C8B-B14F-4D97-AF65-F5344CB8AC3E}">
-        <p14:creationId xmlns:p14="http://schemas.microsoft.com/office/powerpoint/2010/main" val="1664287076"/>
-      </p:ext>
-    </p:extLst>
-  </p:cSld>
-  <p:clrMapOvr>
-    <a:masterClrMapping/>
-  </p:clrMapOvr>
-</p:sld>
-</file>
-
-<file path=ppt/slides/slide21.xml><?xml version="1.0" encoding="utf-8"?>
-<p:sld xmlns:a="http://schemas.openxmlformats.org/drawingml/2006/main" xmlns:r="http://schemas.openxmlformats.org/officeDocument/2006/relationships" xmlns:p="http://schemas.openxmlformats.org/presentationml/2006/main">
-  <p:cSld>
-    <p:spTree>
-      <p:nvGrpSpPr>
-        <p:cNvPr id="1" name="">
-          <a:extLst>
-            <a:ext uri="{FF2B5EF4-FFF2-40B4-BE49-F238E27FC236}">
-              <a16:creationId xmlns:a16="http://schemas.microsoft.com/office/drawing/2014/main" id="{BCE78E47-FE14-8C81-D294-B8B4361081DB}"/>
-            </a:ext>
-          </a:extLst>
-        </p:cNvPr>
-        <p:cNvGrpSpPr/>
-        <p:nvPr/>
-      </p:nvGrpSpPr>
-      <p:grpSpPr>
-        <a:xfrm>
-          <a:off x="0" y="0"/>
-          <a:ext cx="0" cy="0"/>
-          <a:chOff x="0" y="0"/>
-          <a:chExt cx="0" cy="0"/>
-        </a:xfrm>
-      </p:grpSpPr>
       <p:sp>
         <p:nvSpPr>
-          <p:cNvPr id="2" name="Title 1">
-            <a:extLst>
-              <a:ext uri="{FF2B5EF4-FFF2-40B4-BE49-F238E27FC236}">
-                <a16:creationId xmlns:a16="http://schemas.microsoft.com/office/drawing/2014/main" id="{E5E15EAF-9EF7-A57D-C7D9-6C6239B35552}"/>
-              </a:ext>
-            </a:extLst>
-          </p:cNvPr>
-          <p:cNvSpPr>
-            <a:spLocks noGrp="1"/>
+          <p:cNvPr id="5" name="Content Placeholder 2">
+            <a:extLst>
+              <a:ext uri="{FF2B5EF4-FFF2-40B4-BE49-F238E27FC236}">
+                <a16:creationId xmlns:a16="http://schemas.microsoft.com/office/drawing/2014/main" id="{FA09B115-EB37-E99B-E70A-C9DE48F2335B}"/>
+              </a:ext>
+            </a:extLst>
+          </p:cNvPr>
+          <p:cNvSpPr txBox="1">
+            <a:spLocks/>
           </p:cNvSpPr>
-          <p:nvPr>
-            <p:ph type="title"/>
-          </p:nvPr>
+          <p:nvPr/>
         </p:nvSpPr>
-        <p:spPr/>
+        <p:spPr>
+          <a:xfrm>
+            <a:off x="838200" y="1825625"/>
+            <a:ext cx="10515600" cy="1693430"/>
+          </a:xfrm>
+          <a:prstGeom prst="rect">
+            <a:avLst/>
+          </a:prstGeom>
+        </p:spPr>
         <p:txBody>
-          <a:bodyPr/>
-          <a:lstStyle/>
-          <a:p>
-            <a:r>
-              <a:rPr lang="en-US" dirty="0"/>
-              <a:t>Challenges &amp; Future Enhancements</a:t>
-            </a:r>
-            <a:endParaRPr lang="en-PK" dirty="0"/>
-          </a:p>
-        </p:txBody>
-      </p:sp>
-      <p:sp>
-        <p:nvSpPr>
-          <p:cNvPr id="3" name="Content Placeholder 2">
-            <a:extLst>
-              <a:ext uri="{FF2B5EF4-FFF2-40B4-BE49-F238E27FC236}">
-                <a16:creationId xmlns:a16="http://schemas.microsoft.com/office/drawing/2014/main" id="{BB48BDDA-F1AC-9BDD-34C0-09AB256748A7}"/>
-              </a:ext>
-            </a:extLst>
-          </p:cNvPr>
-          <p:cNvSpPr>
-            <a:spLocks noGrp="1"/>
-          </p:cNvSpPr>
-          <p:nvPr>
-            <p:ph idx="1"/>
-          </p:nvPr>
-        </p:nvSpPr>
-        <p:spPr/>
-        <p:txBody>
-          <a:bodyPr>
+          <a:bodyPr vert="horz" lIns="91440" tIns="45720" rIns="91440" bIns="45720" rtlCol="0">
             <a:normAutofit/>
           </a:bodyPr>
-          <a:lstStyle/>
+          <a:lstStyle>
+            <a:lvl1pPr marL="228600" indent="-228600" algn="l" defTabSz="914400" rtl="0" eaLnBrk="1" latinLnBrk="0" hangingPunct="1">
+              <a:lnSpc>
+                <a:spcPct val="90000"/>
+              </a:lnSpc>
+              <a:spcBef>
+                <a:spcPts val="1000"/>
+              </a:spcBef>
+              <a:buFont typeface="Arial" panose="020B0604020202020204" pitchFamily="34" charset="0"/>
+              <a:buChar char="•"/>
+              <a:defRPr sz="2800" kern="1200">
+                <a:solidFill>
+                  <a:schemeClr val="tx1"/>
+                </a:solidFill>
+                <a:latin typeface="+mn-lt"/>
+                <a:ea typeface="+mn-ea"/>
+                <a:cs typeface="+mn-cs"/>
+              </a:defRPr>
+            </a:lvl1pPr>
+            <a:lvl2pPr marL="685800" indent="-228600" algn="l" defTabSz="914400" rtl="0" eaLnBrk="1" latinLnBrk="0" hangingPunct="1">
+              <a:lnSpc>
+                <a:spcPct val="90000"/>
+              </a:lnSpc>
+              <a:spcBef>
+                <a:spcPts val="500"/>
+              </a:spcBef>
+              <a:buFont typeface="Arial" panose="020B0604020202020204" pitchFamily="34" charset="0"/>
+              <a:buChar char="•"/>
+              <a:defRPr sz="2400" kern="1200">
+                <a:solidFill>
+                  <a:schemeClr val="tx1"/>
+                </a:solidFill>
+                <a:latin typeface="+mn-lt"/>
+                <a:ea typeface="+mn-ea"/>
+                <a:cs typeface="+mn-cs"/>
+              </a:defRPr>
+            </a:lvl2pPr>
+            <a:lvl3pPr marL="1143000" indent="-228600" algn="l" defTabSz="914400" rtl="0" eaLnBrk="1" latinLnBrk="0" hangingPunct="1">
+              <a:lnSpc>
+                <a:spcPct val="90000"/>
+              </a:lnSpc>
+              <a:spcBef>
+                <a:spcPts val="500"/>
+              </a:spcBef>
+              <a:buFont typeface="Arial" panose="020B0604020202020204" pitchFamily="34" charset="0"/>
+              <a:buChar char="•"/>
+              <a:defRPr sz="2000" kern="1200">
+                <a:solidFill>
+                  <a:schemeClr val="tx1"/>
+                </a:solidFill>
+                <a:latin typeface="+mn-lt"/>
+                <a:ea typeface="+mn-ea"/>
+                <a:cs typeface="+mn-cs"/>
+              </a:defRPr>
+            </a:lvl3pPr>
+            <a:lvl4pPr marL="1600200" indent="-228600" algn="l" defTabSz="914400" rtl="0" eaLnBrk="1" latinLnBrk="0" hangingPunct="1">
+              <a:lnSpc>
+                <a:spcPct val="90000"/>
+              </a:lnSpc>
+              <a:spcBef>
+                <a:spcPts val="500"/>
+              </a:spcBef>
+              <a:buFont typeface="Arial" panose="020B0604020202020204" pitchFamily="34" charset="0"/>
+              <a:buChar char="•"/>
+              <a:defRPr sz="1800" kern="1200">
+                <a:solidFill>
+                  <a:schemeClr val="tx1"/>
+                </a:solidFill>
+                <a:latin typeface="+mn-lt"/>
+                <a:ea typeface="+mn-ea"/>
+                <a:cs typeface="+mn-cs"/>
+              </a:defRPr>
+            </a:lvl4pPr>
+            <a:lvl5pPr marL="2057400" indent="-228600" algn="l" defTabSz="914400" rtl="0" eaLnBrk="1" latinLnBrk="0" hangingPunct="1">
+              <a:lnSpc>
+                <a:spcPct val="90000"/>
+              </a:lnSpc>
+              <a:spcBef>
+                <a:spcPts val="500"/>
+              </a:spcBef>
+              <a:buFont typeface="Arial" panose="020B0604020202020204" pitchFamily="34" charset="0"/>
+              <a:buChar char="•"/>
+              <a:defRPr sz="1800" kern="1200">
+                <a:solidFill>
+                  <a:schemeClr val="tx1"/>
+                </a:solidFill>
+                <a:latin typeface="+mn-lt"/>
+                <a:ea typeface="+mn-ea"/>
+                <a:cs typeface="+mn-cs"/>
+              </a:defRPr>
+            </a:lvl5pPr>
+            <a:lvl6pPr marL="2514600" indent="-228600" algn="l" defTabSz="914400" rtl="0" eaLnBrk="1" latinLnBrk="0" hangingPunct="1">
+              <a:lnSpc>
+                <a:spcPct val="90000"/>
+              </a:lnSpc>
+              <a:spcBef>
+                <a:spcPts val="500"/>
+              </a:spcBef>
+              <a:buFont typeface="Arial" panose="020B0604020202020204" pitchFamily="34" charset="0"/>
+              <a:buChar char="•"/>
+              <a:defRPr sz="1800" kern="1200">
+                <a:solidFill>
+                  <a:schemeClr val="tx1"/>
+                </a:solidFill>
+                <a:latin typeface="+mn-lt"/>
+                <a:ea typeface="+mn-ea"/>
+                <a:cs typeface="+mn-cs"/>
+              </a:defRPr>
+            </a:lvl6pPr>
+            <a:lvl7pPr marL="2971800" indent="-228600" algn="l" defTabSz="914400" rtl="0" eaLnBrk="1" latinLnBrk="0" hangingPunct="1">
+              <a:lnSpc>
+                <a:spcPct val="90000"/>
+              </a:lnSpc>
+              <a:spcBef>
+                <a:spcPts val="500"/>
+              </a:spcBef>
+              <a:buFont typeface="Arial" panose="020B0604020202020204" pitchFamily="34" charset="0"/>
+              <a:buChar char="•"/>
+              <a:defRPr sz="1800" kern="1200">
+                <a:solidFill>
+                  <a:schemeClr val="tx1"/>
+                </a:solidFill>
+                <a:latin typeface="+mn-lt"/>
+                <a:ea typeface="+mn-ea"/>
+                <a:cs typeface="+mn-cs"/>
+              </a:defRPr>
+            </a:lvl7pPr>
+            <a:lvl8pPr marL="3429000" indent="-228600" algn="l" defTabSz="914400" rtl="0" eaLnBrk="1" latinLnBrk="0" hangingPunct="1">
+              <a:lnSpc>
+                <a:spcPct val="90000"/>
+              </a:lnSpc>
+              <a:spcBef>
+                <a:spcPts val="500"/>
+              </a:spcBef>
+              <a:buFont typeface="Arial" panose="020B0604020202020204" pitchFamily="34" charset="0"/>
+              <a:buChar char="•"/>
+              <a:defRPr sz="1800" kern="1200">
+                <a:solidFill>
+                  <a:schemeClr val="tx1"/>
+                </a:solidFill>
+                <a:latin typeface="+mn-lt"/>
+                <a:ea typeface="+mn-ea"/>
+                <a:cs typeface="+mn-cs"/>
+              </a:defRPr>
+            </a:lvl8pPr>
+            <a:lvl9pPr marL="3886200" indent="-228600" algn="l" defTabSz="914400" rtl="0" eaLnBrk="1" latinLnBrk="0" hangingPunct="1">
+              <a:lnSpc>
+                <a:spcPct val="90000"/>
+              </a:lnSpc>
+              <a:spcBef>
+                <a:spcPts val="500"/>
+              </a:spcBef>
+              <a:buFont typeface="Arial" panose="020B0604020202020204" pitchFamily="34" charset="0"/>
+              <a:buChar char="•"/>
+              <a:defRPr sz="1800" kern="1200">
+                <a:solidFill>
+                  <a:schemeClr val="tx1"/>
+                </a:solidFill>
+                <a:latin typeface="+mn-lt"/>
+                <a:ea typeface="+mn-ea"/>
+                <a:cs typeface="+mn-cs"/>
+              </a:defRPr>
+            </a:lvl9pPr>
+          </a:lstStyle>
           <a:p>
             <a:pPr marL="0" indent="0">
+              <a:buFont typeface="Arial" panose="020B0604020202020204" pitchFamily="34" charset="0"/>
               <a:buNone/>
             </a:pPr>
             <a:r>
               <a:rPr lang="en-US" b="1" dirty="0"/>
-              <a:t>Future Enhancements:</a:t>
-            </a:r>
-          </a:p>
-          <a:p>
-            <a:pPr marL="0" indent="0">
-              <a:buNone/>
-            </a:pPr>
-            <a:endParaRPr lang="en-US" b="1" dirty="0"/>
+              <a:t>Challenges:</a:t>
+            </a:r>
           </a:p>
           <a:p>
             <a:pPr>
@@ -6852,7 +7069,7 @@
             </a:pPr>
             <a:r>
               <a:rPr lang="en-US" dirty="0"/>
-              <a:t>AI-based Cry Detection – Recognizing baby’s cries.</a:t>
+              <a:t>Sensor Calibration Issues – Ensuring accuracy.</a:t>
             </a:r>
           </a:p>
           <a:p>
@@ -6862,79 +7079,8 @@
             </a:pPr>
             <a:r>
               <a:rPr lang="en-US" dirty="0"/>
-              <a:t>Sleep Pattern Monitoring – Using machine learning.</a:t>
-            </a:r>
-          </a:p>
-          <a:p>
-            <a:pPr>
-              <a:buFont typeface="Wingdings" panose="05000000000000000000" pitchFamily="2" charset="2"/>
-              <a:buChar char="q"/>
-            </a:pPr>
-            <a:r>
-              <a:rPr lang="en-US" dirty="0"/>
-              <a:t>Integration with Smart Home Systems – Google Home/Alexa.</a:t>
-            </a:r>
-          </a:p>
-          <a:p>
-            <a:pPr marL="0" indent="0">
-              <a:buNone/>
-            </a:pPr>
-            <a:endParaRPr lang="en-PK" dirty="0"/>
-          </a:p>
-        </p:txBody>
-      </p:sp>
-      <p:sp>
-        <p:nvSpPr>
-          <p:cNvPr id="4" name="Rectangle 3">
-            <a:extLst>
-              <a:ext uri="{FF2B5EF4-FFF2-40B4-BE49-F238E27FC236}">
-                <a16:creationId xmlns:a16="http://schemas.microsoft.com/office/drawing/2014/main" id="{C898119E-4C11-EA16-2A7A-CBEAAB99F14F}"/>
-              </a:ext>
-            </a:extLst>
-          </p:cNvPr>
-          <p:cNvSpPr/>
-          <p:nvPr/>
-        </p:nvSpPr>
-        <p:spPr>
-          <a:xfrm>
-            <a:off x="241300" y="203200"/>
-            <a:ext cx="11785600" cy="6451600"/>
-          </a:xfrm>
-          <a:prstGeom prst="rect">
-            <a:avLst/>
-          </a:prstGeom>
-          <a:noFill/>
-          <a:ln w="63500">
-            <a:solidFill>
-              <a:schemeClr val="tx2">
-                <a:lumMod val="75000"/>
-                <a:lumOff val="25000"/>
-              </a:schemeClr>
-            </a:solidFill>
-          </a:ln>
-        </p:spPr>
-        <p:style>
-          <a:lnRef idx="2">
-            <a:schemeClr val="accent1">
-              <a:shade val="15000"/>
-            </a:schemeClr>
-          </a:lnRef>
-          <a:fillRef idx="1">
-            <a:schemeClr val="accent1"/>
-          </a:fillRef>
-          <a:effectRef idx="0">
-            <a:schemeClr val="accent1"/>
-          </a:effectRef>
-          <a:fontRef idx="minor">
-            <a:schemeClr val="lt1"/>
-          </a:fontRef>
-        </p:style>
-        <p:txBody>
-          <a:bodyPr rtlCol="0" anchor="ctr"/>
-          <a:lstStyle/>
-          <a:p>
-            <a:pPr algn="ctr"/>
-            <a:endParaRPr lang="en-PK"/>
+              <a:t>Optimization – optimizing processing &amp; system load.</a:t>
+            </a:r>
           </a:p>
         </p:txBody>
       </p:sp>
@@ -6951,7 +7097,7 @@
 </p:sld>
 </file>
 
-<file path=ppt/slides/slide22.xml><?xml version="1.0" encoding="utf-8"?>
+<file path=ppt/slides/slide21.xml><?xml version="1.0" encoding="utf-8"?>
 <p:sld xmlns:a="http://schemas.openxmlformats.org/drawingml/2006/main" xmlns:r="http://schemas.openxmlformats.org/officeDocument/2006/relationships" xmlns:p="http://schemas.openxmlformats.org/presentationml/2006/main">
   <p:cSld>
     <p:spTree>
@@ -7142,7 +7288,7 @@
 </p:sld>
 </file>
 
-<file path=ppt/slides/slide23.xml><?xml version="1.0" encoding="utf-8"?>
+<file path=ppt/slides/slide22.xml><?xml version="1.0" encoding="utf-8"?>
 <p:sld xmlns:a="http://schemas.openxmlformats.org/drawingml/2006/main" xmlns:r="http://schemas.openxmlformats.org/officeDocument/2006/relationships" xmlns:p="http://schemas.openxmlformats.org/presentationml/2006/main">
   <p:cSld>
     <p:spTree>
@@ -7204,7 +7350,7 @@
             <p:ph idx="1"/>
             <p:extLst>
               <p:ext uri="{D42A27DB-BD31-4B8C-83A1-F6EECF244321}">
-                <p14:modId xmlns:p14="http://schemas.microsoft.com/office/powerpoint/2010/main" val="3765760661"/>
+                <p14:modId xmlns:p14="http://schemas.microsoft.com/office/powerpoint/2010/main" val="1672064422"/>
               </p:ext>
             </p:extLst>
           </p:nvPr>
@@ -7565,7 +7711,7 @@
 </p:sld>
 </file>
 
-<file path=ppt/slides/slide24.xml><?xml version="1.0" encoding="utf-8"?>
+<file path=ppt/slides/slide23.xml><?xml version="1.0" encoding="utf-8"?>
 <p:sld xmlns:a="http://schemas.openxmlformats.org/drawingml/2006/main" xmlns:r="http://schemas.openxmlformats.org/officeDocument/2006/relationships" xmlns:p="http://schemas.openxmlformats.org/presentationml/2006/main">
   <p:cSld>
     <p:spTree>
@@ -7999,7 +8145,7 @@
 </p:sld>
 </file>
 
-<file path=ppt/slides/slide25.xml><?xml version="1.0" encoding="utf-8"?>
+<file path=ppt/slides/slide24.xml><?xml version="1.0" encoding="utf-8"?>
 <p:sld xmlns:a="http://schemas.openxmlformats.org/drawingml/2006/main" xmlns:r="http://schemas.openxmlformats.org/officeDocument/2006/relationships" xmlns:p="http://schemas.openxmlformats.org/presentationml/2006/main">
   <p:cSld>
     <p:spTree>
@@ -8193,7 +8339,7 @@
 </p:sld>
 </file>
 
-<file path=ppt/slides/slide26.xml><?xml version="1.0" encoding="utf-8"?>
+<file path=ppt/slides/slide25.xml><?xml version="1.0" encoding="utf-8"?>
 <p:sld xmlns:a="http://schemas.openxmlformats.org/drawingml/2006/main" xmlns:r="http://schemas.openxmlformats.org/officeDocument/2006/relationships" xmlns:p="http://schemas.openxmlformats.org/presentationml/2006/main">
   <p:cSld>
     <p:spTree>
@@ -8752,7 +8898,7 @@
 </p:sld>
 </file>
 
-<file path=ppt/slides/slide27.xml><?xml version="1.0" encoding="utf-8"?>
+<file path=ppt/slides/slide26.xml><?xml version="1.0" encoding="utf-8"?>
 <p:sld xmlns:a="http://schemas.openxmlformats.org/drawingml/2006/main" xmlns:r="http://schemas.openxmlformats.org/officeDocument/2006/relationships" xmlns:p="http://schemas.openxmlformats.org/presentationml/2006/main">
   <p:cSld>
     <p:spTree>
@@ -8816,28 +8962,66 @@
         </p:nvSpPr>
         <p:spPr/>
         <p:txBody>
-          <a:bodyPr/>
+          <a:bodyPr>
+            <a:normAutofit/>
+          </a:bodyPr>
           <a:lstStyle/>
           <a:p>
-            <a:pPr marL="0" indent="0">
-              <a:buNone/>
-            </a:pPr>
-            <a:r>
-              <a:rPr lang="en-US" dirty="0"/>
-              <a:t>Git Hub Link</a:t>
-            </a:r>
-          </a:p>
-          <a:p>
-            <a:pPr lvl="1">
+            <a:pPr>
               <a:buFont typeface="Wingdings" panose="05000000000000000000" pitchFamily="2" charset="2"/>
               <a:buChar char="q"/>
             </a:pPr>
             <a:r>
+              <a:rPr lang="en-US" dirty="0"/>
+              <a:t>GitHub Repository: </a:t>
+            </a:r>
+            <a:r>
               <a:rPr lang="en-US" dirty="0">
                 <a:hlinkClick r:id="rId2"/>
               </a:rPr>
-              <a:t> https://github.com/fasih124/FYP_203</a:t>
-            </a:r>
+              <a:t>https://github.com/fasih124/FYP_203</a:t>
+            </a:r>
+            <a:endParaRPr lang="en-US" dirty="0"/>
+          </a:p>
+          <a:p>
+            <a:pPr>
+              <a:buFont typeface="Wingdings" panose="05000000000000000000" pitchFamily="2" charset="2"/>
+              <a:buChar char="q"/>
+            </a:pPr>
+            <a:r>
+              <a:rPr lang="en-US" dirty="0"/>
+              <a:t>Centers for Disease Control and Prevention. (2023). Depression Among Women. </a:t>
+            </a:r>
+            <a:r>
+              <a:rPr lang="en-US" dirty="0">
+                <a:hlinkClick r:id="rId3"/>
+              </a:rPr>
+              <a:t>www.nichd.nih.gov/ncmhep/initiatives/moms-mental-health-matters/moms</a:t>
+            </a:r>
+            <a:endParaRPr lang="en-US" dirty="0"/>
+          </a:p>
+          <a:p>
+            <a:pPr>
+              <a:buFont typeface="Wingdings" panose="05000000000000000000" pitchFamily="2" charset="2"/>
+              <a:buChar char="q"/>
+            </a:pPr>
+            <a:r>
+              <a:rPr lang="en-US" dirty="0"/>
+              <a:t>World Health Organization. (2023).Newborn health: </a:t>
+            </a:r>
+            <a:r>
+              <a:rPr lang="en-US" dirty="0">
+                <a:hlinkClick r:id="rId4"/>
+              </a:rPr>
+              <a:t>https://www.who.int/health-topics/newborn-health/#tab=tab_1</a:t>
+            </a:r>
+            <a:endParaRPr lang="en-US" dirty="0"/>
+          </a:p>
+          <a:p>
+            <a:pPr>
+              <a:buFont typeface="Wingdings" panose="05000000000000000000" pitchFamily="2" charset="2"/>
+              <a:buChar char="q"/>
+            </a:pPr>
             <a:endParaRPr lang="en-US" dirty="0"/>
           </a:p>
         </p:txBody>
@@ -8910,7 +9094,7 @@
 </p:sld>
 </file>
 
-<file path=ppt/slides/slide28.xml><?xml version="1.0" encoding="utf-8"?>
+<file path=ppt/slides/slide27.xml><?xml version="1.0" encoding="utf-8"?>
 <p:sld xmlns:a="http://schemas.openxmlformats.org/drawingml/2006/main" xmlns:r="http://schemas.openxmlformats.org/officeDocument/2006/relationships" xmlns:p="http://schemas.openxmlformats.org/presentationml/2006/main">
   <p:cSld>
     <p:bg>
@@ -9933,6 +10117,21 @@
           </a:bodyPr>
           <a:lstStyle/>
           <a:p>
+            <a:pPr marL="0" indent="0">
+              <a:buNone/>
+            </a:pPr>
+            <a:r>
+              <a:rPr lang="en-US" dirty="0"/>
+              <a:t>Parents face difficulty in continuously supervising their newborns, leading to stress, reduced productivity, and potential health and safety risks for both parent and child.</a:t>
+            </a:r>
+          </a:p>
+          <a:p>
+            <a:pPr marL="0" indent="0">
+              <a:buNone/>
+            </a:pPr>
+            <a:endParaRPr lang="en-US" dirty="0"/>
+          </a:p>
+          <a:p>
             <a:pPr>
               <a:buFont typeface="Wingdings" panose="05000000000000000000" pitchFamily="2" charset="2"/>
               <a:buChar char="q"/>
@@ -9976,24 +10175,6 @@
             <a:r>
               <a:rPr lang="en-US" u="sng" dirty="0"/>
               <a:t>multiple monitoring features</a:t>
-            </a:r>
-            <a:r>
-              <a:rPr lang="en-US" dirty="0"/>
-              <a:t>.</a:t>
-            </a:r>
-          </a:p>
-          <a:p>
-            <a:pPr>
-              <a:buFont typeface="Wingdings" panose="05000000000000000000" pitchFamily="2" charset="2"/>
-              <a:buChar char="q"/>
-            </a:pPr>
-            <a:r>
-              <a:rPr lang="en-US" dirty="0"/>
-              <a:t>High parental stress due to </a:t>
-            </a:r>
-            <a:r>
-              <a:rPr lang="en-US" u="sng" dirty="0"/>
-              <a:t>lack of automated Notification</a:t>
             </a:r>
             <a:r>
               <a:rPr lang="en-US" dirty="0"/>
@@ -13337,7 +13518,12 @@
             <p:ph idx="1"/>
           </p:nvPr>
         </p:nvSpPr>
-        <p:spPr/>
+        <p:spPr>
+          <a:xfrm>
+            <a:off x="876300" y="2141537"/>
+            <a:ext cx="10515600" cy="3500506"/>
+          </a:xfrm>
+        </p:spPr>
         <p:txBody>
           <a:bodyPr>
             <a:normAutofit/>

</xml_diff>

<commit_message>
fix bug in file
</commit_message>
<xml_diff>
--- a/Requirement/specification/CareNest.pptx
+++ b/Requirement/specification/CareNest.pptx
@@ -223,7 +223,7 @@
           <a:p>
             <a:fld id="{D9FB863F-6DA7-4E2C-9AF4-A1919C443414}" type="datetimeFigureOut">
               <a:rPr lang="en-PK" smtClean="0"/>
-              <a:t>07/13/2025</a:t>
+              <a:t>07/15/2025</a:t>
             </a:fld>
             <a:endParaRPr lang="en-PK"/>
           </a:p>
@@ -916,7 +916,7 @@
           <a:p>
             <a:fld id="{FDD5305B-B2D0-43AA-9C84-A120827CAE0A}" type="datetimeFigureOut">
               <a:rPr lang="en-PK" smtClean="0"/>
-              <a:t>07/13/2025</a:t>
+              <a:t>07/15/2025</a:t>
             </a:fld>
             <a:endParaRPr lang="en-PK"/>
           </a:p>
@@ -1116,7 +1116,7 @@
           <a:p>
             <a:fld id="{FDD5305B-B2D0-43AA-9C84-A120827CAE0A}" type="datetimeFigureOut">
               <a:rPr lang="en-PK" smtClean="0"/>
-              <a:t>07/13/2025</a:t>
+              <a:t>07/15/2025</a:t>
             </a:fld>
             <a:endParaRPr lang="en-PK"/>
           </a:p>
@@ -1326,7 +1326,7 @@
           <a:p>
             <a:fld id="{FDD5305B-B2D0-43AA-9C84-A120827CAE0A}" type="datetimeFigureOut">
               <a:rPr lang="en-PK" smtClean="0"/>
-              <a:t>07/13/2025</a:t>
+              <a:t>07/15/2025</a:t>
             </a:fld>
             <a:endParaRPr lang="en-PK"/>
           </a:p>
@@ -1526,7 +1526,7 @@
           <a:p>
             <a:fld id="{FDD5305B-B2D0-43AA-9C84-A120827CAE0A}" type="datetimeFigureOut">
               <a:rPr lang="en-PK" smtClean="0"/>
-              <a:t>07/13/2025</a:t>
+              <a:t>07/15/2025</a:t>
             </a:fld>
             <a:endParaRPr lang="en-PK"/>
           </a:p>
@@ -1802,7 +1802,7 @@
           <a:p>
             <a:fld id="{FDD5305B-B2D0-43AA-9C84-A120827CAE0A}" type="datetimeFigureOut">
               <a:rPr lang="en-PK" smtClean="0"/>
-              <a:t>07/13/2025</a:t>
+              <a:t>07/15/2025</a:t>
             </a:fld>
             <a:endParaRPr lang="en-PK"/>
           </a:p>
@@ -2070,7 +2070,7 @@
           <a:p>
             <a:fld id="{FDD5305B-B2D0-43AA-9C84-A120827CAE0A}" type="datetimeFigureOut">
               <a:rPr lang="en-PK" smtClean="0"/>
-              <a:t>07/13/2025</a:t>
+              <a:t>07/15/2025</a:t>
             </a:fld>
             <a:endParaRPr lang="en-PK"/>
           </a:p>
@@ -2485,7 +2485,7 @@
           <a:p>
             <a:fld id="{FDD5305B-B2D0-43AA-9C84-A120827CAE0A}" type="datetimeFigureOut">
               <a:rPr lang="en-PK" smtClean="0"/>
-              <a:t>07/13/2025</a:t>
+              <a:t>07/15/2025</a:t>
             </a:fld>
             <a:endParaRPr lang="en-PK"/>
           </a:p>
@@ -2627,7 +2627,7 @@
           <a:p>
             <a:fld id="{FDD5305B-B2D0-43AA-9C84-A120827CAE0A}" type="datetimeFigureOut">
               <a:rPr lang="en-PK" smtClean="0"/>
-              <a:t>07/13/2025</a:t>
+              <a:t>07/15/2025</a:t>
             </a:fld>
             <a:endParaRPr lang="en-PK"/>
           </a:p>
@@ -2740,7 +2740,7 @@
           <a:p>
             <a:fld id="{FDD5305B-B2D0-43AA-9C84-A120827CAE0A}" type="datetimeFigureOut">
               <a:rPr lang="en-PK" smtClean="0"/>
-              <a:t>07/13/2025</a:t>
+              <a:t>07/15/2025</a:t>
             </a:fld>
             <a:endParaRPr lang="en-PK"/>
           </a:p>
@@ -3053,7 +3053,7 @@
           <a:p>
             <a:fld id="{FDD5305B-B2D0-43AA-9C84-A120827CAE0A}" type="datetimeFigureOut">
               <a:rPr lang="en-PK" smtClean="0"/>
-              <a:t>07/13/2025</a:t>
+              <a:t>07/15/2025</a:t>
             </a:fld>
             <a:endParaRPr lang="en-PK"/>
           </a:p>
@@ -3342,7 +3342,7 @@
           <a:p>
             <a:fld id="{FDD5305B-B2D0-43AA-9C84-A120827CAE0A}" type="datetimeFigureOut">
               <a:rPr lang="en-PK" smtClean="0"/>
-              <a:t>07/13/2025</a:t>
+              <a:t>07/15/2025</a:t>
             </a:fld>
             <a:endParaRPr lang="en-PK"/>
           </a:p>
@@ -3585,7 +3585,7 @@
           <a:p>
             <a:fld id="{FDD5305B-B2D0-43AA-9C84-A120827CAE0A}" type="datetimeFigureOut">
               <a:rPr lang="en-PK" smtClean="0"/>
-              <a:t>07/13/2025</a:t>
+              <a:t>07/15/2025</a:t>
             </a:fld>
             <a:endParaRPr lang="en-PK"/>
           </a:p>
@@ -7350,7 +7350,7 @@
             <p:ph idx="1"/>
             <p:extLst>
               <p:ext uri="{D42A27DB-BD31-4B8C-83A1-F6EECF244321}">
-                <p14:modId xmlns:p14="http://schemas.microsoft.com/office/powerpoint/2010/main" val="1672064422"/>
+                <p14:modId xmlns:p14="http://schemas.microsoft.com/office/powerpoint/2010/main" val="4066249696"/>
               </p:ext>
             </p:extLst>
           </p:nvPr>
@@ -7464,7 +7464,7 @@
                       <a:pPr algn="ctr"/>
                       <a:r>
                         <a:rPr lang="en-US" dirty="0"/>
-                        <a:t>Sensors</a:t>
+                        <a:t>Peripheral Sensors</a:t>
                       </a:r>
                       <a:endParaRPr lang="en-PK" dirty="0"/>
                     </a:p>
@@ -7479,7 +7479,7 @@
                       <a:pPr algn="ctr"/>
                       <a:r>
                         <a:rPr lang="en-US" dirty="0"/>
-                        <a:t>Rs 1500</a:t>
+                        <a:t>Rs 5000</a:t>
                       </a:r>
                       <a:endParaRPr lang="en-PK" dirty="0"/>
                     </a:p>
@@ -7626,7 +7626,7 @@
                       <a:pPr algn="ctr"/>
                       <a:r>
                         <a:rPr lang="en-US" b="1" dirty="0"/>
-                        <a:t>RS 5500</a:t>
+                        <a:t>RS 9500</a:t>
                       </a:r>
                       <a:endParaRPr lang="en-PK" b="1" dirty="0"/>
                     </a:p>
@@ -10147,20 +10147,6 @@
             <a:r>
               <a:rPr lang="en-US" dirty="0"/>
               <a:t>their baby.</a:t>
-            </a:r>
-          </a:p>
-          <a:p>
-            <a:pPr>
-              <a:buFont typeface="Wingdings" panose="05000000000000000000" pitchFamily="2" charset="2"/>
-              <a:buChar char="q"/>
-            </a:pPr>
-            <a:r>
-              <a:rPr lang="en-US" u="sng" dirty="0"/>
-              <a:t>Health risks</a:t>
-            </a:r>
-            <a:r>
-              <a:rPr lang="en-US" dirty="0"/>
-              <a:t>: overheating, air quality, diaper rash, loud noise.</a:t>
             </a:r>
           </a:p>
           <a:p>

</xml_diff>